<commit_message>
iiRDS Version 1.3 (Release Date 03 November 2025)
</commit_message>
<xml_diff>
--- a/images/src/ContainerFormatGraphics.pptx
+++ b/images/src/ContainerFormatGraphics.pptx
@@ -2,11 +2,12 @@
 <file path=ppt/presentation.xml><?xml version="1.0" encoding="utf-8"?>
 <p:presentation xmlns:a="http://schemas.openxmlformats.org/drawingml/2006/main" xmlns:r="http://schemas.openxmlformats.org/officeDocument/2006/relationships" xmlns:p="http://schemas.openxmlformats.org/presentationml/2006/main" saveSubsetFonts="1">
   <p:sldMasterIdLst>
-    <p:sldMasterId id="2147483648" r:id="rId1"/>
+    <p:sldMasterId id="2147483648" r:id="rId3"/>
   </p:sldMasterIdLst>
   <p:sldIdLst>
-    <p:sldId id="256" r:id="rId2"/>
-    <p:sldId id="257" r:id="rId3"/>
+    <p:sldId id="256" r:id="rId4"/>
+    <p:sldId id="258" r:id="rId5"/>
+    <p:sldId id="257" r:id="rId6"/>
   </p:sldIdLst>
   <p:sldSz cx="12192000" cy="6858000"/>
   <p:notesSz cx="6858000" cy="9144000"/>
@@ -113,10 +114,6 @@
 </p:presentation>
 </file>
 
-<file path=ppt/revisionInfo.xml><?xml version="1.0" encoding="utf-8"?>
-<p1510:revInfo xmlns:a="http://schemas.openxmlformats.org/drawingml/2006/main" xmlns:r="http://schemas.openxmlformats.org/officeDocument/2006/relationships" xmlns:p1510="http://schemas.microsoft.com/office/powerpoint/2015/10/main"/>
-</file>
-
 <file path=ppt/slideLayouts/slideLayout1.xml><?xml version="1.0" encoding="utf-8"?>
 <p:sldLayout xmlns:a="http://schemas.openxmlformats.org/drawingml/2006/main" xmlns:r="http://schemas.openxmlformats.org/officeDocument/2006/relationships" xmlns:p="http://schemas.openxmlformats.org/presentationml/2006/main" type="title" preserve="1">
   <p:cSld name="Titelfolie">
@@ -246,7 +243,7 @@
           <a:p>
             <a:fld id="{46C6970E-8F2E-40AD-9B42-16BBC92B51E7}" type="datetimeFigureOut">
               <a:rPr lang="de-DE" smtClean="0"/>
-              <a:t>12.04.2018</a:t>
+              <a:t>19.12.2024</a:t>
             </a:fld>
             <a:endParaRPr lang="de-DE" dirty="0"/>
           </a:p>
@@ -414,7 +411,7 @@
           <a:p>
             <a:fld id="{46C6970E-8F2E-40AD-9B42-16BBC92B51E7}" type="datetimeFigureOut">
               <a:rPr lang="de-DE" smtClean="0"/>
-              <a:t>12.04.2018</a:t>
+              <a:t>19.12.2024</a:t>
             </a:fld>
             <a:endParaRPr lang="de-DE" dirty="0"/>
           </a:p>
@@ -592,7 +589,7 @@
           <a:p>
             <a:fld id="{46C6970E-8F2E-40AD-9B42-16BBC92B51E7}" type="datetimeFigureOut">
               <a:rPr lang="de-DE" smtClean="0"/>
-              <a:t>12.04.2018</a:t>
+              <a:t>19.12.2024</a:t>
             </a:fld>
             <a:endParaRPr lang="de-DE" dirty="0"/>
           </a:p>
@@ -760,7 +757,7 @@
           <a:p>
             <a:fld id="{46C6970E-8F2E-40AD-9B42-16BBC92B51E7}" type="datetimeFigureOut">
               <a:rPr lang="de-DE" smtClean="0"/>
-              <a:t>12.04.2018</a:t>
+              <a:t>19.12.2024</a:t>
             </a:fld>
             <a:endParaRPr lang="de-DE" dirty="0"/>
           </a:p>
@@ -1005,7 +1002,7 @@
           <a:p>
             <a:fld id="{46C6970E-8F2E-40AD-9B42-16BBC92B51E7}" type="datetimeFigureOut">
               <a:rPr lang="de-DE" smtClean="0"/>
-              <a:t>12.04.2018</a:t>
+              <a:t>19.12.2024</a:t>
             </a:fld>
             <a:endParaRPr lang="de-DE" dirty="0"/>
           </a:p>
@@ -1234,7 +1231,7 @@
           <a:p>
             <a:fld id="{46C6970E-8F2E-40AD-9B42-16BBC92B51E7}" type="datetimeFigureOut">
               <a:rPr lang="de-DE" smtClean="0"/>
-              <a:t>12.04.2018</a:t>
+              <a:t>19.12.2024</a:t>
             </a:fld>
             <a:endParaRPr lang="de-DE" dirty="0"/>
           </a:p>
@@ -1598,7 +1595,7 @@
           <a:p>
             <a:fld id="{46C6970E-8F2E-40AD-9B42-16BBC92B51E7}" type="datetimeFigureOut">
               <a:rPr lang="de-DE" smtClean="0"/>
-              <a:t>12.04.2018</a:t>
+              <a:t>19.12.2024</a:t>
             </a:fld>
             <a:endParaRPr lang="de-DE" dirty="0"/>
           </a:p>
@@ -1715,7 +1712,7 @@
           <a:p>
             <a:fld id="{46C6970E-8F2E-40AD-9B42-16BBC92B51E7}" type="datetimeFigureOut">
               <a:rPr lang="de-DE" smtClean="0"/>
-              <a:t>12.04.2018</a:t>
+              <a:t>19.12.2024</a:t>
             </a:fld>
             <a:endParaRPr lang="de-DE" dirty="0"/>
           </a:p>
@@ -1810,7 +1807,7 @@
           <a:p>
             <a:fld id="{46C6970E-8F2E-40AD-9B42-16BBC92B51E7}" type="datetimeFigureOut">
               <a:rPr lang="de-DE" smtClean="0"/>
-              <a:t>12.04.2018</a:t>
+              <a:t>19.12.2024</a:t>
             </a:fld>
             <a:endParaRPr lang="de-DE" dirty="0"/>
           </a:p>
@@ -2085,7 +2082,7 @@
           <a:p>
             <a:fld id="{46C6970E-8F2E-40AD-9B42-16BBC92B51E7}" type="datetimeFigureOut">
               <a:rPr lang="de-DE" smtClean="0"/>
-              <a:t>12.04.2018</a:t>
+              <a:t>19.12.2024</a:t>
             </a:fld>
             <a:endParaRPr lang="de-DE" dirty="0"/>
           </a:p>
@@ -2337,7 +2334,7 @@
           <a:p>
             <a:fld id="{46C6970E-8F2E-40AD-9B42-16BBC92B51E7}" type="datetimeFigureOut">
               <a:rPr lang="de-DE" smtClean="0"/>
-              <a:t>12.04.2018</a:t>
+              <a:t>19.12.2024</a:t>
             </a:fld>
             <a:endParaRPr lang="de-DE" dirty="0"/>
           </a:p>
@@ -2548,7 +2545,7 @@
           <a:p>
             <a:fld id="{46C6970E-8F2E-40AD-9B42-16BBC92B51E7}" type="datetimeFigureOut">
               <a:rPr lang="de-DE" smtClean="0"/>
-              <a:t>12.04.2018</a:t>
+              <a:t>19.12.2024</a:t>
             </a:fld>
             <a:endParaRPr lang="de-DE" dirty="0"/>
           </a:p>
@@ -2962,7 +2959,7 @@
         <p:spPr>
           <a:xfrm>
             <a:off x="1423102" y="665020"/>
-            <a:ext cx="5462649" cy="3078550"/>
+            <a:ext cx="5462649" cy="3496782"/>
           </a:xfrm>
           <a:prstGeom prst="roundRect">
             <a:avLst/>
@@ -3032,9 +3029,9 @@
           <p:nvPr/>
         </p:nvCxnSpPr>
         <p:spPr>
-          <a:xfrm>
-            <a:off x="2387600" y="1422400"/>
-            <a:ext cx="0" cy="1725273"/>
+          <a:xfrm flipH="1">
+            <a:off x="2387599" y="1422400"/>
+            <a:ext cx="1" cy="2084195"/>
           </a:xfrm>
           <a:prstGeom prst="line">
             <a:avLst/>
@@ -3159,14 +3156,15 @@
         <p:nvCxnSpPr>
           <p:cNvPr id="16" name="Gerader Verbinder 15"/>
           <p:cNvCxnSpPr>
+            <a:cxnSpLocks/>
             <a:stCxn id="12" idx="2"/>
           </p:cNvCxnSpPr>
           <p:nvPr/>
         </p:nvCxnSpPr>
         <p:spPr>
-          <a:xfrm flipH="1">
-            <a:off x="3602224" y="1937503"/>
-            <a:ext cx="1" cy="369332"/>
+          <a:xfrm>
+            <a:off x="3602225" y="1937503"/>
+            <a:ext cx="0" cy="669372"/>
           </a:xfrm>
           <a:prstGeom prst="line">
             <a:avLst/>
@@ -3264,7 +3262,7 @@
         </p:nvCxnSpPr>
         <p:spPr>
           <a:xfrm flipH="1">
-            <a:off x="2387599" y="2772020"/>
+            <a:off x="2387599" y="3130942"/>
             <a:ext cx="662423" cy="0"/>
           </a:xfrm>
           <a:prstGeom prst="line">
@@ -3299,7 +3297,7 @@
         </p:nvSpPr>
         <p:spPr>
           <a:xfrm>
-            <a:off x="3050022" y="2587354"/>
+            <a:off x="3050022" y="2946276"/>
             <a:ext cx="3037563" cy="369332"/>
           </a:xfrm>
           <a:prstGeom prst="rect">
@@ -3328,7 +3326,7 @@
         </p:nvCxnSpPr>
         <p:spPr>
           <a:xfrm flipH="1">
-            <a:off x="2387599" y="3147673"/>
+            <a:off x="2387599" y="3506595"/>
             <a:ext cx="662423" cy="0"/>
           </a:xfrm>
           <a:prstGeom prst="line">
@@ -3363,7 +3361,7 @@
         </p:nvSpPr>
         <p:spPr>
           <a:xfrm>
-            <a:off x="3050022" y="2963007"/>
+            <a:off x="3050022" y="3321929"/>
             <a:ext cx="3037563" cy="646331"/>
           </a:xfrm>
           <a:prstGeom prst="rect">
@@ -3391,6 +3389,83 @@
           </a:p>
         </p:txBody>
       </p:sp>
+      <p:sp>
+        <p:nvSpPr>
+          <p:cNvPr id="2" name="Textfeld 1">
+            <a:extLst>
+              <a:ext uri="{FF2B5EF4-FFF2-40B4-BE49-F238E27FC236}">
+                <a16:creationId xmlns:a16="http://schemas.microsoft.com/office/drawing/2014/main" id="{0496A1F2-20D2-255B-75B6-59F121B7E51A}"/>
+              </a:ext>
+            </a:extLst>
+          </p:cNvPr>
+          <p:cNvSpPr txBox="1"/>
+          <p:nvPr/>
+        </p:nvSpPr>
+        <p:spPr>
+          <a:xfrm>
+            <a:off x="4264645" y="2413411"/>
+            <a:ext cx="2676951" cy="369332"/>
+          </a:xfrm>
+          <a:prstGeom prst="rect">
+            <a:avLst/>
+          </a:prstGeom>
+          <a:noFill/>
+        </p:spPr>
+        <p:txBody>
+          <a:bodyPr wrap="none" rtlCol="0">
+            <a:spAutoFit/>
+          </a:bodyPr>
+          <a:lstStyle/>
+          <a:p>
+            <a:r>
+              <a:rPr lang="de-DE"/>
+              <a:t>metadata.jsonld (optional)</a:t>
+            </a:r>
+            <a:endParaRPr lang="de-DE" dirty="0"/>
+          </a:p>
+        </p:txBody>
+      </p:sp>
+      <p:cxnSp>
+        <p:nvCxnSpPr>
+          <p:cNvPr id="3" name="Gerader Verbinder 2">
+            <a:extLst>
+              <a:ext uri="{FF2B5EF4-FFF2-40B4-BE49-F238E27FC236}">
+                <a16:creationId xmlns:a16="http://schemas.microsoft.com/office/drawing/2014/main" id="{6E5272D9-B808-E426-8708-A4956D3D1F91}"/>
+              </a:ext>
+            </a:extLst>
+          </p:cNvPr>
+          <p:cNvCxnSpPr/>
+          <p:nvPr/>
+        </p:nvCxnSpPr>
+        <p:spPr>
+          <a:xfrm flipH="1">
+            <a:off x="3602224" y="2606875"/>
+            <a:ext cx="662423" cy="1601"/>
+          </a:xfrm>
+          <a:prstGeom prst="line">
+            <a:avLst/>
+          </a:prstGeom>
+          <a:ln>
+            <a:solidFill>
+              <a:schemeClr val="tx1"/>
+            </a:solidFill>
+          </a:ln>
+        </p:spPr>
+        <p:style>
+          <a:lnRef idx="1">
+            <a:schemeClr val="accent1"/>
+          </a:lnRef>
+          <a:fillRef idx="0">
+            <a:schemeClr val="accent1"/>
+          </a:fillRef>
+          <a:effectRef idx="0">
+            <a:schemeClr val="accent1"/>
+          </a:effectRef>
+          <a:fontRef idx="minor">
+            <a:schemeClr val="tx1"/>
+          </a:fontRef>
+        </p:style>
+      </p:cxnSp>
     </p:spTree>
     <p:extLst>
       <p:ext uri="{BB962C8B-B14F-4D97-AF65-F5344CB8AC3E}">
@@ -3409,6 +3484,1031 @@
   <p:cSld>
     <p:spTree>
       <p:nvGrpSpPr>
+        <p:cNvPr id="1" name="">
+          <a:extLst>
+            <a:ext uri="{FF2B5EF4-FFF2-40B4-BE49-F238E27FC236}">
+              <a16:creationId xmlns:a16="http://schemas.microsoft.com/office/drawing/2014/main" id="{245C2912-3442-8452-F988-453A473337EB}"/>
+            </a:ext>
+          </a:extLst>
+        </p:cNvPr>
+        <p:cNvGrpSpPr/>
+        <p:nvPr/>
+      </p:nvGrpSpPr>
+      <p:grpSpPr>
+        <a:xfrm>
+          <a:off x="0" y="0"/>
+          <a:ext cx="0" cy="0"/>
+          <a:chOff x="0" y="0"/>
+          <a:chExt cx="0" cy="0"/>
+        </a:xfrm>
+      </p:grpSpPr>
+      <p:sp>
+        <p:nvSpPr>
+          <p:cNvPr id="39" name="Abgerundetes Rechteck 3">
+            <a:extLst>
+              <a:ext uri="{FF2B5EF4-FFF2-40B4-BE49-F238E27FC236}">
+                <a16:creationId xmlns:a16="http://schemas.microsoft.com/office/drawing/2014/main" id="{EFB092A7-808A-C2D2-DE6C-8B8A4F3F0040}"/>
+              </a:ext>
+            </a:extLst>
+          </p:cNvPr>
+          <p:cNvSpPr/>
+          <p:nvPr/>
+        </p:nvSpPr>
+        <p:spPr>
+          <a:xfrm>
+            <a:off x="1423102" y="665019"/>
+            <a:ext cx="5462649" cy="4624809"/>
+          </a:xfrm>
+          <a:prstGeom prst="roundRect">
+            <a:avLst/>
+          </a:prstGeom>
+        </p:spPr>
+        <p:style>
+          <a:lnRef idx="2">
+            <a:schemeClr val="accent1">
+              <a:shade val="50000"/>
+            </a:schemeClr>
+          </a:lnRef>
+          <a:fillRef idx="1002">
+            <a:schemeClr val="lt2"/>
+          </a:fillRef>
+          <a:effectRef idx="0">
+            <a:schemeClr val="accent1"/>
+          </a:effectRef>
+          <a:fontRef idx="minor">
+            <a:schemeClr val="lt1"/>
+          </a:fontRef>
+        </p:style>
+        <p:txBody>
+          <a:bodyPr rtlCol="0" anchor="ctr"/>
+          <a:lstStyle/>
+          <a:p>
+            <a:pPr algn="ctr"/>
+            <a:endParaRPr lang="de-DE" dirty="0"/>
+          </a:p>
+        </p:txBody>
+      </p:sp>
+      <p:sp>
+        <p:nvSpPr>
+          <p:cNvPr id="5" name="Textfeld 4">
+            <a:extLst>
+              <a:ext uri="{FF2B5EF4-FFF2-40B4-BE49-F238E27FC236}">
+                <a16:creationId xmlns:a16="http://schemas.microsoft.com/office/drawing/2014/main" id="{0DC4E08D-5278-43B8-3439-BF7A82811454}"/>
+              </a:ext>
+            </a:extLst>
+          </p:cNvPr>
+          <p:cNvSpPr txBox="1"/>
+          <p:nvPr/>
+        </p:nvSpPr>
+        <p:spPr>
+          <a:xfrm>
+            <a:off x="4568803" y="652958"/>
+            <a:ext cx="1798185" cy="400110"/>
+          </a:xfrm>
+          <a:prstGeom prst="rect">
+            <a:avLst/>
+          </a:prstGeom>
+          <a:noFill/>
+        </p:spPr>
+        <p:txBody>
+          <a:bodyPr wrap="none" rtlCol="0">
+            <a:spAutoFit/>
+          </a:bodyPr>
+          <a:lstStyle/>
+          <a:p>
+            <a:r>
+              <a:rPr lang="de-DE" sz="2000" dirty="0"/>
+              <a:t>iiRDS Container</a:t>
+            </a:r>
+          </a:p>
+        </p:txBody>
+      </p:sp>
+      <p:cxnSp>
+        <p:nvCxnSpPr>
+          <p:cNvPr id="7" name="Gerader Verbinder 6">
+            <a:extLst>
+              <a:ext uri="{FF2B5EF4-FFF2-40B4-BE49-F238E27FC236}">
+                <a16:creationId xmlns:a16="http://schemas.microsoft.com/office/drawing/2014/main" id="{7D1F4B30-3680-F3C7-201A-AD98F3D87183}"/>
+              </a:ext>
+            </a:extLst>
+          </p:cNvPr>
+          <p:cNvCxnSpPr>
+            <a:cxnSpLocks/>
+            <a:stCxn id="9" idx="2"/>
+          </p:cNvCxnSpPr>
+          <p:nvPr/>
+        </p:nvCxnSpPr>
+        <p:spPr>
+          <a:xfrm flipH="1">
+            <a:off x="2028674" y="1354032"/>
+            <a:ext cx="4" cy="3465794"/>
+          </a:xfrm>
+          <a:prstGeom prst="line">
+            <a:avLst/>
+          </a:prstGeom>
+          <a:ln>
+            <a:solidFill>
+              <a:schemeClr val="tx1"/>
+            </a:solidFill>
+          </a:ln>
+        </p:spPr>
+        <p:style>
+          <a:lnRef idx="1">
+            <a:schemeClr val="accent1"/>
+          </a:lnRef>
+          <a:fillRef idx="0">
+            <a:schemeClr val="accent1"/>
+          </a:fillRef>
+          <a:effectRef idx="0">
+            <a:schemeClr val="accent1"/>
+          </a:effectRef>
+          <a:fontRef idx="minor">
+            <a:schemeClr val="tx1"/>
+          </a:fontRef>
+        </p:style>
+      </p:cxnSp>
+      <p:sp>
+        <p:nvSpPr>
+          <p:cNvPr id="9" name="Textfeld 8">
+            <a:extLst>
+              <a:ext uri="{FF2B5EF4-FFF2-40B4-BE49-F238E27FC236}">
+                <a16:creationId xmlns:a16="http://schemas.microsoft.com/office/drawing/2014/main" id="{0B3B25CE-3E58-B994-AB8D-D930C75190FE}"/>
+              </a:ext>
+            </a:extLst>
+          </p:cNvPr>
+          <p:cNvSpPr txBox="1"/>
+          <p:nvPr/>
+        </p:nvSpPr>
+        <p:spPr>
+          <a:xfrm>
+            <a:off x="1715900" y="984700"/>
+            <a:ext cx="625556" cy="369332"/>
+          </a:xfrm>
+          <a:prstGeom prst="rect">
+            <a:avLst/>
+          </a:prstGeom>
+          <a:noFill/>
+        </p:spPr>
+        <p:txBody>
+          <a:bodyPr wrap="none" rtlCol="0">
+            <a:spAutoFit/>
+          </a:bodyPr>
+          <a:lstStyle/>
+          <a:p>
+            <a:r>
+              <a:rPr lang="de-DE" dirty="0"/>
+              <a:t>Root</a:t>
+            </a:r>
+          </a:p>
+        </p:txBody>
+      </p:sp>
+      <p:sp>
+        <p:nvSpPr>
+          <p:cNvPr id="12" name="Textfeld 11">
+            <a:extLst>
+              <a:ext uri="{FF2B5EF4-FFF2-40B4-BE49-F238E27FC236}">
+                <a16:creationId xmlns:a16="http://schemas.microsoft.com/office/drawing/2014/main" id="{6A85BEC8-67F0-A3A8-EC2D-3D661E7BAF19}"/>
+              </a:ext>
+            </a:extLst>
+          </p:cNvPr>
+          <p:cNvSpPr txBox="1"/>
+          <p:nvPr/>
+        </p:nvSpPr>
+        <p:spPr>
+          <a:xfrm>
+            <a:off x="2691100" y="1499803"/>
+            <a:ext cx="1104405" cy="369332"/>
+          </a:xfrm>
+          <a:prstGeom prst="rect">
+            <a:avLst/>
+          </a:prstGeom>
+          <a:noFill/>
+        </p:spPr>
+        <p:txBody>
+          <a:bodyPr wrap="none" rtlCol="0">
+            <a:spAutoFit/>
+          </a:bodyPr>
+          <a:lstStyle/>
+          <a:p>
+            <a:r>
+              <a:rPr lang="de-DE" dirty="0"/>
+              <a:t>META-INF</a:t>
+            </a:r>
+          </a:p>
+        </p:txBody>
+      </p:sp>
+      <p:cxnSp>
+        <p:nvCxnSpPr>
+          <p:cNvPr id="14" name="Gerader Verbinder 13">
+            <a:extLst>
+              <a:ext uri="{FF2B5EF4-FFF2-40B4-BE49-F238E27FC236}">
+                <a16:creationId xmlns:a16="http://schemas.microsoft.com/office/drawing/2014/main" id="{783EF187-56F7-D1A6-8C98-130AC226F797}"/>
+              </a:ext>
+            </a:extLst>
+          </p:cNvPr>
+          <p:cNvCxnSpPr>
+            <a:stCxn id="12" idx="1"/>
+          </p:cNvCxnSpPr>
+          <p:nvPr/>
+        </p:nvCxnSpPr>
+        <p:spPr>
+          <a:xfrm flipH="1">
+            <a:off x="2028677" y="1684469"/>
+            <a:ext cx="662423" cy="0"/>
+          </a:xfrm>
+          <a:prstGeom prst="line">
+            <a:avLst/>
+          </a:prstGeom>
+          <a:ln>
+            <a:solidFill>
+              <a:schemeClr val="tx1"/>
+            </a:solidFill>
+          </a:ln>
+        </p:spPr>
+        <p:style>
+          <a:lnRef idx="1">
+            <a:schemeClr val="accent1"/>
+          </a:lnRef>
+          <a:fillRef idx="0">
+            <a:schemeClr val="accent1"/>
+          </a:fillRef>
+          <a:effectRef idx="0">
+            <a:schemeClr val="accent1"/>
+          </a:effectRef>
+          <a:fontRef idx="minor">
+            <a:schemeClr val="tx1"/>
+          </a:fontRef>
+        </p:style>
+      </p:cxnSp>
+      <p:cxnSp>
+        <p:nvCxnSpPr>
+          <p:cNvPr id="16" name="Gerader Verbinder 15">
+            <a:extLst>
+              <a:ext uri="{FF2B5EF4-FFF2-40B4-BE49-F238E27FC236}">
+                <a16:creationId xmlns:a16="http://schemas.microsoft.com/office/drawing/2014/main" id="{CEAA98EA-E714-5286-56A7-4593019A6547}"/>
+              </a:ext>
+            </a:extLst>
+          </p:cNvPr>
+          <p:cNvCxnSpPr>
+            <a:cxnSpLocks/>
+          </p:cNvCxnSpPr>
+          <p:nvPr/>
+        </p:nvCxnSpPr>
+        <p:spPr>
+          <a:xfrm>
+            <a:off x="3029659" y="1869135"/>
+            <a:ext cx="0" cy="669372"/>
+          </a:xfrm>
+          <a:prstGeom prst="line">
+            <a:avLst/>
+          </a:prstGeom>
+          <a:ln>
+            <a:solidFill>
+              <a:schemeClr val="tx1"/>
+            </a:solidFill>
+          </a:ln>
+        </p:spPr>
+        <p:style>
+          <a:lnRef idx="1">
+            <a:schemeClr val="accent1"/>
+          </a:lnRef>
+          <a:fillRef idx="0">
+            <a:schemeClr val="accent1"/>
+          </a:fillRef>
+          <a:effectRef idx="0">
+            <a:schemeClr val="accent1"/>
+          </a:effectRef>
+          <a:fontRef idx="minor">
+            <a:schemeClr val="tx1"/>
+          </a:fontRef>
+        </p:style>
+      </p:cxnSp>
+      <p:cxnSp>
+        <p:nvCxnSpPr>
+          <p:cNvPr id="17" name="Gerader Verbinder 16">
+            <a:extLst>
+              <a:ext uri="{FF2B5EF4-FFF2-40B4-BE49-F238E27FC236}">
+                <a16:creationId xmlns:a16="http://schemas.microsoft.com/office/drawing/2014/main" id="{A9C8369F-C17E-16AA-BB94-A231B6C67D8D}"/>
+              </a:ext>
+            </a:extLst>
+          </p:cNvPr>
+          <p:cNvCxnSpPr/>
+          <p:nvPr/>
+        </p:nvCxnSpPr>
+        <p:spPr>
+          <a:xfrm flipH="1">
+            <a:off x="3029659" y="2236866"/>
+            <a:ext cx="662423" cy="1601"/>
+          </a:xfrm>
+          <a:prstGeom prst="line">
+            <a:avLst/>
+          </a:prstGeom>
+          <a:ln>
+            <a:solidFill>
+              <a:schemeClr val="tx1"/>
+            </a:solidFill>
+          </a:ln>
+        </p:spPr>
+        <p:style>
+          <a:lnRef idx="1">
+            <a:schemeClr val="accent1"/>
+          </a:lnRef>
+          <a:fillRef idx="0">
+            <a:schemeClr val="accent1"/>
+          </a:fillRef>
+          <a:effectRef idx="0">
+            <a:schemeClr val="accent1"/>
+          </a:effectRef>
+          <a:fontRef idx="minor">
+            <a:schemeClr val="tx1"/>
+          </a:fontRef>
+        </p:style>
+      </p:cxnSp>
+      <p:sp>
+        <p:nvSpPr>
+          <p:cNvPr id="18" name="Textfeld 17">
+            <a:extLst>
+              <a:ext uri="{FF2B5EF4-FFF2-40B4-BE49-F238E27FC236}">
+                <a16:creationId xmlns:a16="http://schemas.microsoft.com/office/drawing/2014/main" id="{3A34A5E3-08ED-E807-2590-EA8A4C13DF66}"/>
+              </a:ext>
+            </a:extLst>
+          </p:cNvPr>
+          <p:cNvSpPr txBox="1"/>
+          <p:nvPr/>
+        </p:nvSpPr>
+        <p:spPr>
+          <a:xfrm>
+            <a:off x="3692079" y="2052200"/>
+            <a:ext cx="1410066" cy="369332"/>
+          </a:xfrm>
+          <a:prstGeom prst="rect">
+            <a:avLst/>
+          </a:prstGeom>
+          <a:noFill/>
+        </p:spPr>
+        <p:txBody>
+          <a:bodyPr wrap="none" rtlCol="0">
+            <a:spAutoFit/>
+          </a:bodyPr>
+          <a:lstStyle/>
+          <a:p>
+            <a:r>
+              <a:rPr lang="de-DE" dirty="0"/>
+              <a:t>metadata.rdf</a:t>
+            </a:r>
+          </a:p>
+        </p:txBody>
+      </p:sp>
+      <p:cxnSp>
+        <p:nvCxnSpPr>
+          <p:cNvPr id="28" name="Gerader Verbinder 27">
+            <a:extLst>
+              <a:ext uri="{FF2B5EF4-FFF2-40B4-BE49-F238E27FC236}">
+                <a16:creationId xmlns:a16="http://schemas.microsoft.com/office/drawing/2014/main" id="{90C968D8-1883-978D-D922-361BF58E5309}"/>
+              </a:ext>
+            </a:extLst>
+          </p:cNvPr>
+          <p:cNvCxnSpPr/>
+          <p:nvPr/>
+        </p:nvCxnSpPr>
+        <p:spPr>
+          <a:xfrm flipH="1">
+            <a:off x="2028677" y="3062574"/>
+            <a:ext cx="662423" cy="0"/>
+          </a:xfrm>
+          <a:prstGeom prst="line">
+            <a:avLst/>
+          </a:prstGeom>
+          <a:ln>
+            <a:solidFill>
+              <a:schemeClr val="tx1"/>
+            </a:solidFill>
+          </a:ln>
+        </p:spPr>
+        <p:style>
+          <a:lnRef idx="1">
+            <a:schemeClr val="accent1"/>
+          </a:lnRef>
+          <a:fillRef idx="0">
+            <a:schemeClr val="accent1"/>
+          </a:fillRef>
+          <a:effectRef idx="0">
+            <a:schemeClr val="accent1"/>
+          </a:effectRef>
+          <a:fontRef idx="minor">
+            <a:schemeClr val="tx1"/>
+          </a:fontRef>
+        </p:style>
+      </p:cxnSp>
+      <p:sp>
+        <p:nvSpPr>
+          <p:cNvPr id="29" name="Textfeld 28">
+            <a:extLst>
+              <a:ext uri="{FF2B5EF4-FFF2-40B4-BE49-F238E27FC236}">
+                <a16:creationId xmlns:a16="http://schemas.microsoft.com/office/drawing/2014/main" id="{2E8DF0DD-13A5-B673-D6E0-AAF368AFDB6C}"/>
+              </a:ext>
+            </a:extLst>
+          </p:cNvPr>
+          <p:cNvSpPr txBox="1"/>
+          <p:nvPr/>
+        </p:nvSpPr>
+        <p:spPr>
+          <a:xfrm>
+            <a:off x="2691100" y="2877908"/>
+            <a:ext cx="2554225" cy="369332"/>
+          </a:xfrm>
+          <a:prstGeom prst="rect">
+            <a:avLst/>
+          </a:prstGeom>
+          <a:noFill/>
+        </p:spPr>
+        <p:txBody>
+          <a:bodyPr wrap="none" rtlCol="0">
+            <a:spAutoFit/>
+          </a:bodyPr>
+          <a:lstStyle/>
+          <a:p>
+            <a:r>
+              <a:rPr lang="de-DE"/>
+              <a:t>&lt;nested package01.iirds&gt;</a:t>
+            </a:r>
+            <a:endParaRPr lang="de-DE" dirty="0"/>
+          </a:p>
+        </p:txBody>
+      </p:sp>
+      <p:cxnSp>
+        <p:nvCxnSpPr>
+          <p:cNvPr id="31" name="Gerader Verbinder 30">
+            <a:extLst>
+              <a:ext uri="{FF2B5EF4-FFF2-40B4-BE49-F238E27FC236}">
+                <a16:creationId xmlns:a16="http://schemas.microsoft.com/office/drawing/2014/main" id="{A442AEA7-7272-557A-33AD-5BCAF43EC71D}"/>
+              </a:ext>
+            </a:extLst>
+          </p:cNvPr>
+          <p:cNvCxnSpPr/>
+          <p:nvPr/>
+        </p:nvCxnSpPr>
+        <p:spPr>
+          <a:xfrm flipH="1">
+            <a:off x="2028677" y="4822640"/>
+            <a:ext cx="662423" cy="0"/>
+          </a:xfrm>
+          <a:prstGeom prst="line">
+            <a:avLst/>
+          </a:prstGeom>
+          <a:ln>
+            <a:solidFill>
+              <a:schemeClr val="tx1"/>
+            </a:solidFill>
+          </a:ln>
+        </p:spPr>
+        <p:style>
+          <a:lnRef idx="1">
+            <a:schemeClr val="accent1"/>
+          </a:lnRef>
+          <a:fillRef idx="0">
+            <a:schemeClr val="accent1"/>
+          </a:fillRef>
+          <a:effectRef idx="0">
+            <a:schemeClr val="accent1"/>
+          </a:effectRef>
+          <a:fontRef idx="minor">
+            <a:schemeClr val="tx1"/>
+          </a:fontRef>
+        </p:style>
+      </p:cxnSp>
+      <p:sp>
+        <p:nvSpPr>
+          <p:cNvPr id="32" name="Textfeld 31">
+            <a:extLst>
+              <a:ext uri="{FF2B5EF4-FFF2-40B4-BE49-F238E27FC236}">
+                <a16:creationId xmlns:a16="http://schemas.microsoft.com/office/drawing/2014/main" id="{006819B3-1179-A8F6-C263-F8ADFF416CB2}"/>
+              </a:ext>
+            </a:extLst>
+          </p:cNvPr>
+          <p:cNvSpPr txBox="1"/>
+          <p:nvPr/>
+        </p:nvSpPr>
+        <p:spPr>
+          <a:xfrm>
+            <a:off x="2691100" y="4646520"/>
+            <a:ext cx="2554225" cy="646331"/>
+          </a:xfrm>
+          <a:prstGeom prst="rect">
+            <a:avLst/>
+          </a:prstGeom>
+          <a:noFill/>
+        </p:spPr>
+        <p:txBody>
+          <a:bodyPr wrap="none" rtlCol="0">
+            <a:spAutoFit/>
+          </a:bodyPr>
+          <a:lstStyle/>
+          <a:p>
+            <a:r>
+              <a:rPr lang="de-DE"/>
+              <a:t>&lt;nested package02.iirds&gt;</a:t>
+            </a:r>
+          </a:p>
+          <a:p>
+            <a:pPr algn="ctr"/>
+            <a:r>
+              <a:rPr lang="de-DE"/>
+              <a:t>…</a:t>
+            </a:r>
+            <a:endParaRPr lang="de-DE" dirty="0"/>
+          </a:p>
+        </p:txBody>
+      </p:sp>
+      <p:sp>
+        <p:nvSpPr>
+          <p:cNvPr id="2" name="Textfeld 1">
+            <a:extLst>
+              <a:ext uri="{FF2B5EF4-FFF2-40B4-BE49-F238E27FC236}">
+                <a16:creationId xmlns:a16="http://schemas.microsoft.com/office/drawing/2014/main" id="{FC67E14E-2E87-E443-6C78-0754BD988950}"/>
+              </a:ext>
+            </a:extLst>
+          </p:cNvPr>
+          <p:cNvSpPr txBox="1"/>
+          <p:nvPr/>
+        </p:nvSpPr>
+        <p:spPr>
+          <a:xfrm>
+            <a:off x="3692079" y="2345043"/>
+            <a:ext cx="2676951" cy="369332"/>
+          </a:xfrm>
+          <a:prstGeom prst="rect">
+            <a:avLst/>
+          </a:prstGeom>
+          <a:noFill/>
+        </p:spPr>
+        <p:txBody>
+          <a:bodyPr wrap="none" rtlCol="0">
+            <a:spAutoFit/>
+          </a:bodyPr>
+          <a:lstStyle/>
+          <a:p>
+            <a:r>
+              <a:rPr lang="de-DE"/>
+              <a:t>metadata.jsonld (optional)</a:t>
+            </a:r>
+            <a:endParaRPr lang="de-DE" dirty="0"/>
+          </a:p>
+        </p:txBody>
+      </p:sp>
+      <p:cxnSp>
+        <p:nvCxnSpPr>
+          <p:cNvPr id="3" name="Gerader Verbinder 2">
+            <a:extLst>
+              <a:ext uri="{FF2B5EF4-FFF2-40B4-BE49-F238E27FC236}">
+                <a16:creationId xmlns:a16="http://schemas.microsoft.com/office/drawing/2014/main" id="{87E9D80B-677E-A0F4-360F-36660AE5B782}"/>
+              </a:ext>
+            </a:extLst>
+          </p:cNvPr>
+          <p:cNvCxnSpPr/>
+          <p:nvPr/>
+        </p:nvCxnSpPr>
+        <p:spPr>
+          <a:xfrm flipH="1">
+            <a:off x="3029658" y="2538507"/>
+            <a:ext cx="662423" cy="1601"/>
+          </a:xfrm>
+          <a:prstGeom prst="line">
+            <a:avLst/>
+          </a:prstGeom>
+          <a:ln>
+            <a:solidFill>
+              <a:schemeClr val="tx1"/>
+            </a:solidFill>
+          </a:ln>
+        </p:spPr>
+        <p:style>
+          <a:lnRef idx="1">
+            <a:schemeClr val="accent1"/>
+          </a:lnRef>
+          <a:fillRef idx="0">
+            <a:schemeClr val="accent1"/>
+          </a:fillRef>
+          <a:effectRef idx="0">
+            <a:schemeClr val="accent1"/>
+          </a:effectRef>
+          <a:fontRef idx="minor">
+            <a:schemeClr val="tx1"/>
+          </a:fontRef>
+        </p:style>
+      </p:cxnSp>
+      <p:cxnSp>
+        <p:nvCxnSpPr>
+          <p:cNvPr id="20" name="Gerader Verbinder 19">
+            <a:extLst>
+              <a:ext uri="{FF2B5EF4-FFF2-40B4-BE49-F238E27FC236}">
+                <a16:creationId xmlns:a16="http://schemas.microsoft.com/office/drawing/2014/main" id="{9ED8B24E-F94B-AB56-73D1-333E5A5DA4B5}"/>
+              </a:ext>
+            </a:extLst>
+          </p:cNvPr>
+          <p:cNvCxnSpPr>
+            <a:cxnSpLocks/>
+          </p:cNvCxnSpPr>
+          <p:nvPr/>
+        </p:nvCxnSpPr>
+        <p:spPr>
+          <a:xfrm>
+            <a:off x="3022311" y="3231124"/>
+            <a:ext cx="0" cy="1271391"/>
+          </a:xfrm>
+          <a:prstGeom prst="line">
+            <a:avLst/>
+          </a:prstGeom>
+          <a:ln>
+            <a:solidFill>
+              <a:schemeClr val="tx1"/>
+            </a:solidFill>
+          </a:ln>
+        </p:spPr>
+        <p:style>
+          <a:lnRef idx="1">
+            <a:schemeClr val="accent1"/>
+          </a:lnRef>
+          <a:fillRef idx="0">
+            <a:schemeClr val="accent1"/>
+          </a:fillRef>
+          <a:effectRef idx="0">
+            <a:schemeClr val="accent1"/>
+          </a:effectRef>
+          <a:fontRef idx="minor">
+            <a:schemeClr val="tx1"/>
+          </a:fontRef>
+        </p:style>
+      </p:cxnSp>
+      <p:sp>
+        <p:nvSpPr>
+          <p:cNvPr id="21" name="Textfeld 20">
+            <a:extLst>
+              <a:ext uri="{FF2B5EF4-FFF2-40B4-BE49-F238E27FC236}">
+                <a16:creationId xmlns:a16="http://schemas.microsoft.com/office/drawing/2014/main" id="{46B34784-2150-ADC2-B7D2-1B7604FF4083}"/>
+              </a:ext>
+            </a:extLst>
+          </p:cNvPr>
+          <p:cNvSpPr txBox="1"/>
+          <p:nvPr/>
+        </p:nvSpPr>
+        <p:spPr>
+          <a:xfrm>
+            <a:off x="3353815" y="3385883"/>
+            <a:ext cx="1104405" cy="369332"/>
+          </a:xfrm>
+          <a:prstGeom prst="rect">
+            <a:avLst/>
+          </a:prstGeom>
+          <a:noFill/>
+        </p:spPr>
+        <p:txBody>
+          <a:bodyPr wrap="none" rtlCol="0">
+            <a:spAutoFit/>
+          </a:bodyPr>
+          <a:lstStyle/>
+          <a:p>
+            <a:r>
+              <a:rPr lang="de-DE" dirty="0"/>
+              <a:t>META-INF</a:t>
+            </a:r>
+          </a:p>
+        </p:txBody>
+      </p:sp>
+      <p:cxnSp>
+        <p:nvCxnSpPr>
+          <p:cNvPr id="22" name="Gerader Verbinder 21">
+            <a:extLst>
+              <a:ext uri="{FF2B5EF4-FFF2-40B4-BE49-F238E27FC236}">
+                <a16:creationId xmlns:a16="http://schemas.microsoft.com/office/drawing/2014/main" id="{44E9A9F4-3DBC-FD92-356C-003851445654}"/>
+              </a:ext>
+            </a:extLst>
+          </p:cNvPr>
+          <p:cNvCxnSpPr>
+            <a:cxnSpLocks/>
+          </p:cNvCxnSpPr>
+          <p:nvPr/>
+        </p:nvCxnSpPr>
+        <p:spPr>
+          <a:xfrm flipH="1">
+            <a:off x="3022310" y="3561561"/>
+            <a:ext cx="310551" cy="0"/>
+          </a:xfrm>
+          <a:prstGeom prst="line">
+            <a:avLst/>
+          </a:prstGeom>
+          <a:ln>
+            <a:solidFill>
+              <a:schemeClr val="tx1"/>
+            </a:solidFill>
+          </a:ln>
+        </p:spPr>
+        <p:style>
+          <a:lnRef idx="1">
+            <a:schemeClr val="accent1"/>
+          </a:lnRef>
+          <a:fillRef idx="0">
+            <a:schemeClr val="accent1"/>
+          </a:fillRef>
+          <a:effectRef idx="0">
+            <a:schemeClr val="accent1"/>
+          </a:effectRef>
+          <a:fontRef idx="minor">
+            <a:schemeClr val="tx1"/>
+          </a:fontRef>
+        </p:style>
+      </p:cxnSp>
+      <p:cxnSp>
+        <p:nvCxnSpPr>
+          <p:cNvPr id="23" name="Gerader Verbinder 22">
+            <a:extLst>
+              <a:ext uri="{FF2B5EF4-FFF2-40B4-BE49-F238E27FC236}">
+                <a16:creationId xmlns:a16="http://schemas.microsoft.com/office/drawing/2014/main" id="{0FEF77F4-143E-CD6F-B295-B94F674DE5F2}"/>
+              </a:ext>
+            </a:extLst>
+          </p:cNvPr>
+          <p:cNvCxnSpPr>
+            <a:cxnSpLocks/>
+          </p:cNvCxnSpPr>
+          <p:nvPr/>
+        </p:nvCxnSpPr>
+        <p:spPr>
+          <a:xfrm>
+            <a:off x="3574805" y="3755215"/>
+            <a:ext cx="0" cy="438636"/>
+          </a:xfrm>
+          <a:prstGeom prst="line">
+            <a:avLst/>
+          </a:prstGeom>
+          <a:ln>
+            <a:solidFill>
+              <a:schemeClr val="tx1"/>
+            </a:solidFill>
+          </a:ln>
+        </p:spPr>
+        <p:style>
+          <a:lnRef idx="1">
+            <a:schemeClr val="accent1"/>
+          </a:lnRef>
+          <a:fillRef idx="0">
+            <a:schemeClr val="accent1"/>
+          </a:fillRef>
+          <a:effectRef idx="0">
+            <a:schemeClr val="accent1"/>
+          </a:effectRef>
+          <a:fontRef idx="minor">
+            <a:schemeClr val="tx1"/>
+          </a:fontRef>
+        </p:style>
+      </p:cxnSp>
+      <p:cxnSp>
+        <p:nvCxnSpPr>
+          <p:cNvPr id="24" name="Gerader Verbinder 23">
+            <a:extLst>
+              <a:ext uri="{FF2B5EF4-FFF2-40B4-BE49-F238E27FC236}">
+                <a16:creationId xmlns:a16="http://schemas.microsoft.com/office/drawing/2014/main" id="{905B9D90-439C-A6C1-570C-4850F6B1211C}"/>
+              </a:ext>
+            </a:extLst>
+          </p:cNvPr>
+          <p:cNvCxnSpPr/>
+          <p:nvPr/>
+        </p:nvCxnSpPr>
+        <p:spPr>
+          <a:xfrm flipH="1">
+            <a:off x="3574805" y="3892210"/>
+            <a:ext cx="662423" cy="1601"/>
+          </a:xfrm>
+          <a:prstGeom prst="line">
+            <a:avLst/>
+          </a:prstGeom>
+          <a:ln>
+            <a:solidFill>
+              <a:schemeClr val="tx1"/>
+            </a:solidFill>
+          </a:ln>
+        </p:spPr>
+        <p:style>
+          <a:lnRef idx="1">
+            <a:schemeClr val="accent1"/>
+          </a:lnRef>
+          <a:fillRef idx="0">
+            <a:schemeClr val="accent1"/>
+          </a:fillRef>
+          <a:effectRef idx="0">
+            <a:schemeClr val="accent1"/>
+          </a:effectRef>
+          <a:fontRef idx="minor">
+            <a:schemeClr val="tx1"/>
+          </a:fontRef>
+        </p:style>
+      </p:cxnSp>
+      <p:sp>
+        <p:nvSpPr>
+          <p:cNvPr id="25" name="Textfeld 24">
+            <a:extLst>
+              <a:ext uri="{FF2B5EF4-FFF2-40B4-BE49-F238E27FC236}">
+                <a16:creationId xmlns:a16="http://schemas.microsoft.com/office/drawing/2014/main" id="{DE8F42EF-AA29-2141-5600-43420250AE94}"/>
+              </a:ext>
+            </a:extLst>
+          </p:cNvPr>
+          <p:cNvSpPr txBox="1"/>
+          <p:nvPr/>
+        </p:nvSpPr>
+        <p:spPr>
+          <a:xfrm>
+            <a:off x="4237225" y="3707544"/>
+            <a:ext cx="1410066" cy="369332"/>
+          </a:xfrm>
+          <a:prstGeom prst="rect">
+            <a:avLst/>
+          </a:prstGeom>
+          <a:noFill/>
+        </p:spPr>
+        <p:txBody>
+          <a:bodyPr wrap="none" rtlCol="0">
+            <a:spAutoFit/>
+          </a:bodyPr>
+          <a:lstStyle/>
+          <a:p>
+            <a:r>
+              <a:rPr lang="de-DE" dirty="0"/>
+              <a:t>metadata.rdf</a:t>
+            </a:r>
+          </a:p>
+        </p:txBody>
+      </p:sp>
+      <p:cxnSp>
+        <p:nvCxnSpPr>
+          <p:cNvPr id="26" name="Gerader Verbinder 25">
+            <a:extLst>
+              <a:ext uri="{FF2B5EF4-FFF2-40B4-BE49-F238E27FC236}">
+                <a16:creationId xmlns:a16="http://schemas.microsoft.com/office/drawing/2014/main" id="{48223913-0240-71A4-EA3D-60BB80DD1604}"/>
+              </a:ext>
+            </a:extLst>
+          </p:cNvPr>
+          <p:cNvCxnSpPr/>
+          <p:nvPr/>
+        </p:nvCxnSpPr>
+        <p:spPr>
+          <a:xfrm flipH="1">
+            <a:off x="3022308" y="4502515"/>
+            <a:ext cx="662423" cy="0"/>
+          </a:xfrm>
+          <a:prstGeom prst="line">
+            <a:avLst/>
+          </a:prstGeom>
+          <a:ln>
+            <a:solidFill>
+              <a:schemeClr val="tx1"/>
+            </a:solidFill>
+          </a:ln>
+        </p:spPr>
+        <p:style>
+          <a:lnRef idx="1">
+            <a:schemeClr val="accent1"/>
+          </a:lnRef>
+          <a:fillRef idx="0">
+            <a:schemeClr val="accent1"/>
+          </a:fillRef>
+          <a:effectRef idx="0">
+            <a:schemeClr val="accent1"/>
+          </a:effectRef>
+          <a:fontRef idx="minor">
+            <a:schemeClr val="tx1"/>
+          </a:fontRef>
+        </p:style>
+      </p:cxnSp>
+      <p:sp>
+        <p:nvSpPr>
+          <p:cNvPr id="27" name="Textfeld 26">
+            <a:extLst>
+              <a:ext uri="{FF2B5EF4-FFF2-40B4-BE49-F238E27FC236}">
+                <a16:creationId xmlns:a16="http://schemas.microsoft.com/office/drawing/2014/main" id="{693EFB73-CA1D-F22A-50C4-A476DB0C14AC}"/>
+              </a:ext>
+            </a:extLst>
+          </p:cNvPr>
+          <p:cNvSpPr txBox="1"/>
+          <p:nvPr/>
+        </p:nvSpPr>
+        <p:spPr>
+          <a:xfrm>
+            <a:off x="3684731" y="4317849"/>
+            <a:ext cx="3037563" cy="369332"/>
+          </a:xfrm>
+          <a:prstGeom prst="rect">
+            <a:avLst/>
+          </a:prstGeom>
+          <a:noFill/>
+        </p:spPr>
+        <p:txBody>
+          <a:bodyPr wrap="none" rtlCol="0">
+            <a:spAutoFit/>
+          </a:bodyPr>
+          <a:lstStyle/>
+          <a:p>
+            <a:r>
+              <a:rPr lang="de-DE"/>
+              <a:t>&lt;arbitrary directory structure&gt;</a:t>
+            </a:r>
+            <a:endParaRPr lang="de-DE" dirty="0"/>
+          </a:p>
+        </p:txBody>
+      </p:sp>
+      <p:sp>
+        <p:nvSpPr>
+          <p:cNvPr id="30" name="Textfeld 29">
+            <a:extLst>
+              <a:ext uri="{FF2B5EF4-FFF2-40B4-BE49-F238E27FC236}">
+                <a16:creationId xmlns:a16="http://schemas.microsoft.com/office/drawing/2014/main" id="{73375BD4-A30D-E25B-F426-080A974A2C55}"/>
+              </a:ext>
+            </a:extLst>
+          </p:cNvPr>
+          <p:cNvSpPr txBox="1"/>
+          <p:nvPr/>
+        </p:nvSpPr>
+        <p:spPr>
+          <a:xfrm>
+            <a:off x="4237225" y="4000387"/>
+            <a:ext cx="2676951" cy="369332"/>
+          </a:xfrm>
+          <a:prstGeom prst="rect">
+            <a:avLst/>
+          </a:prstGeom>
+          <a:noFill/>
+        </p:spPr>
+        <p:txBody>
+          <a:bodyPr wrap="none" rtlCol="0">
+            <a:spAutoFit/>
+          </a:bodyPr>
+          <a:lstStyle/>
+          <a:p>
+            <a:r>
+              <a:rPr lang="de-DE"/>
+              <a:t>metadata.jsonld (optional)</a:t>
+            </a:r>
+            <a:endParaRPr lang="de-DE" dirty="0"/>
+          </a:p>
+        </p:txBody>
+      </p:sp>
+      <p:cxnSp>
+        <p:nvCxnSpPr>
+          <p:cNvPr id="33" name="Gerader Verbinder 32">
+            <a:extLst>
+              <a:ext uri="{FF2B5EF4-FFF2-40B4-BE49-F238E27FC236}">
+                <a16:creationId xmlns:a16="http://schemas.microsoft.com/office/drawing/2014/main" id="{1ABCC0AD-276A-C5D6-CEC5-89011ECBBEC0}"/>
+              </a:ext>
+            </a:extLst>
+          </p:cNvPr>
+          <p:cNvCxnSpPr/>
+          <p:nvPr/>
+        </p:nvCxnSpPr>
+        <p:spPr>
+          <a:xfrm flipH="1">
+            <a:off x="3574804" y="4193851"/>
+            <a:ext cx="662423" cy="1601"/>
+          </a:xfrm>
+          <a:prstGeom prst="line">
+            <a:avLst/>
+          </a:prstGeom>
+          <a:ln>
+            <a:solidFill>
+              <a:schemeClr val="tx1"/>
+            </a:solidFill>
+          </a:ln>
+        </p:spPr>
+        <p:style>
+          <a:lnRef idx="1">
+            <a:schemeClr val="accent1"/>
+          </a:lnRef>
+          <a:fillRef idx="0">
+            <a:schemeClr val="accent1"/>
+          </a:fillRef>
+          <a:effectRef idx="0">
+            <a:schemeClr val="accent1"/>
+          </a:effectRef>
+          <a:fontRef idx="minor">
+            <a:schemeClr val="tx1"/>
+          </a:fontRef>
+        </p:style>
+      </p:cxnSp>
+    </p:spTree>
+    <p:extLst>
+      <p:ext uri="{BB962C8B-B14F-4D97-AF65-F5344CB8AC3E}">
+        <p14:creationId xmlns:p14="http://schemas.microsoft.com/office/powerpoint/2010/main" val="1668863697"/>
+      </p:ext>
+    </p:extLst>
+  </p:cSld>
+  <p:clrMapOvr>
+    <a:masterClrMapping/>
+  </p:clrMapOvr>
+</p:sld>
+</file>
+
+<file path=ppt/slides/slide3.xml><?xml version="1.0" encoding="utf-8"?>
+<p:sld xmlns:a="http://schemas.openxmlformats.org/drawingml/2006/main" xmlns:r="http://schemas.openxmlformats.org/officeDocument/2006/relationships" xmlns:p="http://schemas.openxmlformats.org/presentationml/2006/main">
+  <p:cSld>
+    <p:spTree>
+      <p:nvGrpSpPr>
         <p:cNvPr id="1" name=""/>
         <p:cNvGrpSpPr/>
         <p:nvPr/>
@@ -3490,112 +4590,75 @@
           </a:p>
         </p:txBody>
       </p:sp>
+      <p:sp>
+        <p:nvSpPr>
+          <p:cNvPr id="9" name="Textfeld 8"/>
+          <p:cNvSpPr txBox="1"/>
+          <p:nvPr/>
+        </p:nvSpPr>
+        <p:spPr>
+          <a:xfrm>
+            <a:off x="2074822" y="1053068"/>
+            <a:ext cx="625556" cy="369332"/>
+          </a:xfrm>
+          <a:prstGeom prst="rect">
+            <a:avLst/>
+          </a:prstGeom>
+          <a:noFill/>
+        </p:spPr>
+        <p:txBody>
+          <a:bodyPr wrap="none" rtlCol="0">
+            <a:spAutoFit/>
+          </a:bodyPr>
+          <a:lstStyle/>
+          <a:p>
+            <a:r>
+              <a:rPr lang="de-DE" dirty="0"/>
+              <a:t>Root</a:t>
+            </a:r>
+          </a:p>
+        </p:txBody>
+      </p:sp>
+      <p:sp>
+        <p:nvSpPr>
+          <p:cNvPr id="19" name="Textfeld 18"/>
+          <p:cNvSpPr txBox="1"/>
+          <p:nvPr/>
+        </p:nvSpPr>
+        <p:spPr>
+          <a:xfrm>
+            <a:off x="3050022" y="1402700"/>
+            <a:ext cx="1138838" cy="369332"/>
+          </a:xfrm>
+          <a:prstGeom prst="rect">
+            <a:avLst/>
+          </a:prstGeom>
+          <a:noFill/>
+        </p:spPr>
+        <p:txBody>
+          <a:bodyPr wrap="none" rtlCol="0">
+            <a:spAutoFit/>
+          </a:bodyPr>
+          <a:lstStyle/>
+          <a:p>
+            <a:r>
+              <a:rPr lang="de-DE" dirty="0"/>
+              <a:t>mimetype</a:t>
+            </a:r>
+          </a:p>
+        </p:txBody>
+      </p:sp>
       <p:cxnSp>
         <p:nvCxnSpPr>
-          <p:cNvPr id="7" name="Gerader Verbinder 6"/>
+          <p:cNvPr id="20" name="Gerader Verbinder 19"/>
           <p:cNvCxnSpPr>
-            <a:stCxn id="9" idx="2"/>
+            <a:stCxn id="19" idx="1"/>
           </p:cNvCxnSpPr>
           <p:nvPr/>
         </p:nvCxnSpPr>
         <p:spPr>
           <a:xfrm flipH="1">
-            <a:off x="2387599" y="1422400"/>
-            <a:ext cx="1" cy="1967551"/>
-          </a:xfrm>
-          <a:prstGeom prst="line">
-            <a:avLst/>
-          </a:prstGeom>
-          <a:ln>
-            <a:solidFill>
-              <a:schemeClr val="tx1"/>
-            </a:solidFill>
-          </a:ln>
-        </p:spPr>
-        <p:style>
-          <a:lnRef idx="1">
-            <a:schemeClr val="accent1"/>
-          </a:lnRef>
-          <a:fillRef idx="0">
-            <a:schemeClr val="accent1"/>
-          </a:fillRef>
-          <a:effectRef idx="0">
-            <a:schemeClr val="accent1"/>
-          </a:effectRef>
-          <a:fontRef idx="minor">
-            <a:schemeClr val="tx1"/>
-          </a:fontRef>
-        </p:style>
-      </p:cxnSp>
-      <p:sp>
-        <p:nvSpPr>
-          <p:cNvPr id="9" name="Textfeld 8"/>
-          <p:cNvSpPr txBox="1"/>
-          <p:nvPr/>
-        </p:nvSpPr>
-        <p:spPr>
-          <a:xfrm>
-            <a:off x="2074822" y="1053068"/>
-            <a:ext cx="625556" cy="369332"/>
-          </a:xfrm>
-          <a:prstGeom prst="rect">
-            <a:avLst/>
-          </a:prstGeom>
-          <a:noFill/>
-        </p:spPr>
-        <p:txBody>
-          <a:bodyPr wrap="none" rtlCol="0">
-            <a:spAutoFit/>
-          </a:bodyPr>
-          <a:lstStyle/>
-          <a:p>
-            <a:r>
-              <a:rPr lang="de-DE" dirty="0"/>
-              <a:t>Root</a:t>
-            </a:r>
-          </a:p>
-        </p:txBody>
-      </p:sp>
-      <p:sp>
-        <p:nvSpPr>
-          <p:cNvPr id="12" name="Textfeld 11"/>
-          <p:cNvSpPr txBox="1"/>
-          <p:nvPr/>
-        </p:nvSpPr>
-        <p:spPr>
-          <a:xfrm>
-            <a:off x="3050022" y="1810449"/>
-            <a:ext cx="1104405" cy="369332"/>
-          </a:xfrm>
-          <a:prstGeom prst="rect">
-            <a:avLst/>
-          </a:prstGeom>
-          <a:noFill/>
-        </p:spPr>
-        <p:txBody>
-          <a:bodyPr wrap="none" rtlCol="0">
-            <a:spAutoFit/>
-          </a:bodyPr>
-          <a:lstStyle/>
-          <a:p>
-            <a:r>
-              <a:rPr lang="de-DE" dirty="0"/>
-              <a:t>META-INF</a:t>
-            </a:r>
-          </a:p>
-        </p:txBody>
-      </p:sp>
-      <p:cxnSp>
-        <p:nvCxnSpPr>
-          <p:cNvPr id="14" name="Gerader Verbinder 13"/>
-          <p:cNvCxnSpPr>
-            <a:stCxn id="12" idx="1"/>
-          </p:cNvCxnSpPr>
-          <p:nvPr/>
-        </p:nvCxnSpPr>
-        <p:spPr>
-          <a:xfrm flipH="1">
-            <a:off x="2387599" y="1995115"/>
+            <a:off x="2387599" y="1587366"/>
             <a:ext cx="662423" cy="0"/>
           </a:xfrm>
           <a:prstGeom prst="line">
@@ -3624,16 +4687,100 @@
       </p:cxnSp>
       <p:cxnSp>
         <p:nvCxnSpPr>
-          <p:cNvPr id="16" name="Gerader Verbinder 15"/>
+          <p:cNvPr id="2" name="Gerader Verbinder 1">
+            <a:extLst>
+              <a:ext uri="{FF2B5EF4-FFF2-40B4-BE49-F238E27FC236}">
+                <a16:creationId xmlns:a16="http://schemas.microsoft.com/office/drawing/2014/main" id="{735D65F1-613F-E7E3-11EE-6A63676A1D50}"/>
+              </a:ext>
+            </a:extLst>
+          </p:cNvPr>
           <p:cNvCxnSpPr>
-            <a:stCxn id="12" idx="2"/>
+            <a:cxnSpLocks/>
           </p:cNvCxnSpPr>
           <p:nvPr/>
         </p:nvCxnSpPr>
         <p:spPr>
           <a:xfrm flipH="1">
-            <a:off x="3602224" y="2179781"/>
-            <a:ext cx="1" cy="369332"/>
+            <a:off x="2387599" y="1422400"/>
+            <a:ext cx="1" cy="2084195"/>
+          </a:xfrm>
+          <a:prstGeom prst="line">
+            <a:avLst/>
+          </a:prstGeom>
+          <a:ln>
+            <a:solidFill>
+              <a:schemeClr val="tx1"/>
+            </a:solidFill>
+          </a:ln>
+        </p:spPr>
+        <p:style>
+          <a:lnRef idx="1">
+            <a:schemeClr val="accent1"/>
+          </a:lnRef>
+          <a:fillRef idx="0">
+            <a:schemeClr val="accent1"/>
+          </a:fillRef>
+          <a:effectRef idx="0">
+            <a:schemeClr val="accent1"/>
+          </a:effectRef>
+          <a:fontRef idx="minor">
+            <a:schemeClr val="tx1"/>
+          </a:fontRef>
+        </p:style>
+      </p:cxnSp>
+      <p:sp>
+        <p:nvSpPr>
+          <p:cNvPr id="3" name="Textfeld 2">
+            <a:extLst>
+              <a:ext uri="{FF2B5EF4-FFF2-40B4-BE49-F238E27FC236}">
+                <a16:creationId xmlns:a16="http://schemas.microsoft.com/office/drawing/2014/main" id="{E6366CC8-9126-3769-F63E-EE2710354308}"/>
+              </a:ext>
+            </a:extLst>
+          </p:cNvPr>
+          <p:cNvSpPr txBox="1"/>
+          <p:nvPr/>
+        </p:nvSpPr>
+        <p:spPr>
+          <a:xfrm>
+            <a:off x="3050022" y="1707871"/>
+            <a:ext cx="1104405" cy="369332"/>
+          </a:xfrm>
+          <a:prstGeom prst="rect">
+            <a:avLst/>
+          </a:prstGeom>
+          <a:noFill/>
+        </p:spPr>
+        <p:txBody>
+          <a:bodyPr wrap="none" rtlCol="0">
+            <a:spAutoFit/>
+          </a:bodyPr>
+          <a:lstStyle/>
+          <a:p>
+            <a:r>
+              <a:rPr lang="de-DE" dirty="0"/>
+              <a:t>META-INF</a:t>
+            </a:r>
+          </a:p>
+        </p:txBody>
+      </p:sp>
+      <p:cxnSp>
+        <p:nvCxnSpPr>
+          <p:cNvPr id="6" name="Gerader Verbinder 5">
+            <a:extLst>
+              <a:ext uri="{FF2B5EF4-FFF2-40B4-BE49-F238E27FC236}">
+                <a16:creationId xmlns:a16="http://schemas.microsoft.com/office/drawing/2014/main" id="{F94BA956-C8D6-F9CD-7C9A-FADB9024125C}"/>
+              </a:ext>
+            </a:extLst>
+          </p:cNvPr>
+          <p:cNvCxnSpPr>
+            <a:stCxn id="3" idx="1"/>
+          </p:cNvCxnSpPr>
+          <p:nvPr/>
+        </p:nvCxnSpPr>
+        <p:spPr>
+          <a:xfrm flipH="1">
+            <a:off x="2387599" y="1892537"/>
+            <a:ext cx="662423" cy="0"/>
           </a:xfrm>
           <a:prstGeom prst="line">
             <a:avLst/>
@@ -3661,109 +4808,23 @@
       </p:cxnSp>
       <p:cxnSp>
         <p:nvCxnSpPr>
-          <p:cNvPr id="17" name="Gerader Verbinder 16"/>
-          <p:cNvCxnSpPr/>
-          <p:nvPr/>
-        </p:nvCxnSpPr>
-        <p:spPr>
-          <a:xfrm flipH="1">
-            <a:off x="3602225" y="2547512"/>
-            <a:ext cx="662423" cy="1601"/>
-          </a:xfrm>
-          <a:prstGeom prst="line">
-            <a:avLst/>
-          </a:prstGeom>
-          <a:ln>
-            <a:solidFill>
-              <a:schemeClr val="tx1"/>
-            </a:solidFill>
-          </a:ln>
-        </p:spPr>
-        <p:style>
-          <a:lnRef idx="1">
-            <a:schemeClr val="accent1"/>
-          </a:lnRef>
-          <a:fillRef idx="0">
-            <a:schemeClr val="accent1"/>
-          </a:fillRef>
-          <a:effectRef idx="0">
-            <a:schemeClr val="accent1"/>
-          </a:effectRef>
-          <a:fontRef idx="minor">
-            <a:schemeClr val="tx1"/>
-          </a:fontRef>
-        </p:style>
-      </p:cxnSp>
-      <p:sp>
-        <p:nvSpPr>
-          <p:cNvPr id="18" name="Textfeld 17"/>
-          <p:cNvSpPr txBox="1"/>
-          <p:nvPr/>
-        </p:nvSpPr>
-        <p:spPr>
-          <a:xfrm>
-            <a:off x="4264645" y="2362846"/>
-            <a:ext cx="1410066" cy="369332"/>
-          </a:xfrm>
-          <a:prstGeom prst="rect">
-            <a:avLst/>
-          </a:prstGeom>
-          <a:noFill/>
-        </p:spPr>
-        <p:txBody>
-          <a:bodyPr wrap="none" rtlCol="0">
-            <a:spAutoFit/>
-          </a:bodyPr>
-          <a:lstStyle/>
-          <a:p>
-            <a:r>
-              <a:rPr lang="de-DE" dirty="0"/>
-              <a:t>metadata.rdf</a:t>
-            </a:r>
-          </a:p>
-        </p:txBody>
-      </p:sp>
-      <p:sp>
-        <p:nvSpPr>
-          <p:cNvPr id="19" name="Textfeld 18"/>
-          <p:cNvSpPr txBox="1"/>
-          <p:nvPr/>
-        </p:nvSpPr>
-        <p:spPr>
-          <a:xfrm>
-            <a:off x="3050022" y="1428100"/>
-            <a:ext cx="1138838" cy="369332"/>
-          </a:xfrm>
-          <a:prstGeom prst="rect">
-            <a:avLst/>
-          </a:prstGeom>
-          <a:noFill/>
-        </p:spPr>
-        <p:txBody>
-          <a:bodyPr wrap="none" rtlCol="0">
-            <a:spAutoFit/>
-          </a:bodyPr>
-          <a:lstStyle/>
-          <a:p>
-            <a:r>
-              <a:rPr lang="de-DE" dirty="0"/>
-              <a:t>mimetype</a:t>
-            </a:r>
-          </a:p>
-        </p:txBody>
-      </p:sp>
-      <p:cxnSp>
-        <p:nvCxnSpPr>
-          <p:cNvPr id="20" name="Gerader Verbinder 19"/>
+          <p:cNvPr id="8" name="Gerader Verbinder 7">
+            <a:extLst>
+              <a:ext uri="{FF2B5EF4-FFF2-40B4-BE49-F238E27FC236}">
+                <a16:creationId xmlns:a16="http://schemas.microsoft.com/office/drawing/2014/main" id="{6742EACE-4D57-FA71-E956-8F3AE99EECA7}"/>
+              </a:ext>
+            </a:extLst>
+          </p:cNvPr>
           <p:cNvCxnSpPr>
-            <a:stCxn id="19" idx="1"/>
+            <a:cxnSpLocks/>
+            <a:stCxn id="3" idx="2"/>
           </p:cNvCxnSpPr>
           <p:nvPr/>
         </p:nvCxnSpPr>
         <p:spPr>
-          <a:xfrm flipH="1">
-            <a:off x="2387599" y="1612766"/>
-            <a:ext cx="662423" cy="0"/>
+          <a:xfrm>
+            <a:off x="3602225" y="2077203"/>
+            <a:ext cx="0" cy="669372"/>
           </a:xfrm>
           <a:prstGeom prst="line">
             <a:avLst/>
@@ -3791,14 +4852,20 @@
       </p:cxnSp>
       <p:cxnSp>
         <p:nvCxnSpPr>
-          <p:cNvPr id="28" name="Gerader Verbinder 27"/>
+          <p:cNvPr id="10" name="Gerader Verbinder 9">
+            <a:extLst>
+              <a:ext uri="{FF2B5EF4-FFF2-40B4-BE49-F238E27FC236}">
+                <a16:creationId xmlns:a16="http://schemas.microsoft.com/office/drawing/2014/main" id="{ECF4C742-28A3-46C4-83E4-593662524383}"/>
+              </a:ext>
+            </a:extLst>
+          </p:cNvPr>
           <p:cNvCxnSpPr/>
           <p:nvPr/>
         </p:nvCxnSpPr>
         <p:spPr>
           <a:xfrm flipH="1">
-            <a:off x="2387599" y="3014298"/>
-            <a:ext cx="662423" cy="0"/>
+            <a:off x="3602225" y="2444934"/>
+            <a:ext cx="662423" cy="1601"/>
           </a:xfrm>
           <a:prstGeom prst="line">
             <a:avLst/>
@@ -3826,14 +4893,20 @@
       </p:cxnSp>
       <p:sp>
         <p:nvSpPr>
-          <p:cNvPr id="29" name="Textfeld 28"/>
+          <p:cNvPr id="11" name="Textfeld 10">
+            <a:extLst>
+              <a:ext uri="{FF2B5EF4-FFF2-40B4-BE49-F238E27FC236}">
+                <a16:creationId xmlns:a16="http://schemas.microsoft.com/office/drawing/2014/main" id="{6E2649C8-D919-AEB8-FF94-5A89C72E543E}"/>
+              </a:ext>
+            </a:extLst>
+          </p:cNvPr>
           <p:cNvSpPr txBox="1"/>
           <p:nvPr/>
         </p:nvSpPr>
         <p:spPr>
           <a:xfrm>
-            <a:off x="3050022" y="2829632"/>
-            <a:ext cx="3037563" cy="369332"/>
+            <a:off x="4264645" y="2260268"/>
+            <a:ext cx="1410066" cy="369332"/>
           </a:xfrm>
           <a:prstGeom prst="rect">
             <a:avLst/>
@@ -3848,20 +4921,26 @@
           <a:p>
             <a:r>
               <a:rPr lang="de-DE" dirty="0"/>
-              <a:t>&lt;arbitrary directory structure&gt;</a:t>
+              <a:t>metadata.rdf</a:t>
             </a:r>
           </a:p>
         </p:txBody>
       </p:sp>
       <p:cxnSp>
         <p:nvCxnSpPr>
-          <p:cNvPr id="31" name="Gerader Verbinder 30"/>
+          <p:cNvPr id="13" name="Gerader Verbinder 12">
+            <a:extLst>
+              <a:ext uri="{FF2B5EF4-FFF2-40B4-BE49-F238E27FC236}">
+                <a16:creationId xmlns:a16="http://schemas.microsoft.com/office/drawing/2014/main" id="{FF721EC8-9CFA-1669-21AA-D552A576C8D9}"/>
+              </a:ext>
+            </a:extLst>
+          </p:cNvPr>
           <p:cNvCxnSpPr/>
           <p:nvPr/>
         </p:nvCxnSpPr>
         <p:spPr>
           <a:xfrm flipH="1">
-            <a:off x="2387599" y="3389951"/>
+            <a:off x="2387599" y="3130942"/>
             <a:ext cx="662423" cy="0"/>
           </a:xfrm>
           <a:prstGeom prst="line">
@@ -3890,14 +4969,20 @@
       </p:cxnSp>
       <p:sp>
         <p:nvSpPr>
-          <p:cNvPr id="32" name="Textfeld 31"/>
+          <p:cNvPr id="15" name="Textfeld 14">
+            <a:extLst>
+              <a:ext uri="{FF2B5EF4-FFF2-40B4-BE49-F238E27FC236}">
+                <a16:creationId xmlns:a16="http://schemas.microsoft.com/office/drawing/2014/main" id="{6C9E6A33-50E7-74E2-5E3E-B9B5979017AC}"/>
+              </a:ext>
+            </a:extLst>
+          </p:cNvPr>
           <p:cNvSpPr txBox="1"/>
           <p:nvPr/>
         </p:nvSpPr>
         <p:spPr>
           <a:xfrm>
-            <a:off x="3050022" y="3205285"/>
-            <a:ext cx="3037563" cy="646331"/>
+            <a:off x="3050022" y="2946276"/>
+            <a:ext cx="3037563" cy="369332"/>
           </a:xfrm>
           <a:prstGeom prst="rect">
             <a:avLst/>
@@ -3915,6 +5000,82 @@
               <a:t>&lt;arbitrary directory structure&gt;</a:t>
             </a:r>
           </a:p>
+        </p:txBody>
+      </p:sp>
+      <p:cxnSp>
+        <p:nvCxnSpPr>
+          <p:cNvPr id="21" name="Gerader Verbinder 20">
+            <a:extLst>
+              <a:ext uri="{FF2B5EF4-FFF2-40B4-BE49-F238E27FC236}">
+                <a16:creationId xmlns:a16="http://schemas.microsoft.com/office/drawing/2014/main" id="{C5D13830-4AE5-15FA-A93C-0579A6EC2D75}"/>
+              </a:ext>
+            </a:extLst>
+          </p:cNvPr>
+          <p:cNvCxnSpPr/>
+          <p:nvPr/>
+        </p:nvCxnSpPr>
+        <p:spPr>
+          <a:xfrm flipH="1">
+            <a:off x="2387599" y="3506595"/>
+            <a:ext cx="662423" cy="0"/>
+          </a:xfrm>
+          <a:prstGeom prst="line">
+            <a:avLst/>
+          </a:prstGeom>
+          <a:ln>
+            <a:solidFill>
+              <a:schemeClr val="tx1"/>
+            </a:solidFill>
+          </a:ln>
+        </p:spPr>
+        <p:style>
+          <a:lnRef idx="1">
+            <a:schemeClr val="accent1"/>
+          </a:lnRef>
+          <a:fillRef idx="0">
+            <a:schemeClr val="accent1"/>
+          </a:fillRef>
+          <a:effectRef idx="0">
+            <a:schemeClr val="accent1"/>
+          </a:effectRef>
+          <a:fontRef idx="minor">
+            <a:schemeClr val="tx1"/>
+          </a:fontRef>
+        </p:style>
+      </p:cxnSp>
+      <p:sp>
+        <p:nvSpPr>
+          <p:cNvPr id="22" name="Textfeld 21">
+            <a:extLst>
+              <a:ext uri="{FF2B5EF4-FFF2-40B4-BE49-F238E27FC236}">
+                <a16:creationId xmlns:a16="http://schemas.microsoft.com/office/drawing/2014/main" id="{402E6225-5A77-C8C1-7946-063E0C6CD9C7}"/>
+              </a:ext>
+            </a:extLst>
+          </p:cNvPr>
+          <p:cNvSpPr txBox="1"/>
+          <p:nvPr/>
+        </p:nvSpPr>
+        <p:spPr>
+          <a:xfrm>
+            <a:off x="3050022" y="3321929"/>
+            <a:ext cx="3037563" cy="646331"/>
+          </a:xfrm>
+          <a:prstGeom prst="rect">
+            <a:avLst/>
+          </a:prstGeom>
+          <a:noFill/>
+        </p:spPr>
+        <p:txBody>
+          <a:bodyPr wrap="none" rtlCol="0">
+            <a:spAutoFit/>
+          </a:bodyPr>
+          <a:lstStyle/>
+          <a:p>
+            <a:r>
+              <a:rPr lang="de-DE" dirty="0"/>
+              <a:t>&lt;arbitrary directory structure&gt;</a:t>
+            </a:r>
+          </a:p>
           <a:p>
             <a:pPr algn="ctr"/>
             <a:r>
@@ -3924,6 +5085,83 @@
           </a:p>
         </p:txBody>
       </p:sp>
+      <p:sp>
+        <p:nvSpPr>
+          <p:cNvPr id="23" name="Textfeld 22">
+            <a:extLst>
+              <a:ext uri="{FF2B5EF4-FFF2-40B4-BE49-F238E27FC236}">
+                <a16:creationId xmlns:a16="http://schemas.microsoft.com/office/drawing/2014/main" id="{AD4267B9-95CD-1AA7-97F9-083CC3EA44CB}"/>
+              </a:ext>
+            </a:extLst>
+          </p:cNvPr>
+          <p:cNvSpPr txBox="1"/>
+          <p:nvPr/>
+        </p:nvSpPr>
+        <p:spPr>
+          <a:xfrm>
+            <a:off x="4264645" y="2553111"/>
+            <a:ext cx="2676951" cy="369332"/>
+          </a:xfrm>
+          <a:prstGeom prst="rect">
+            <a:avLst/>
+          </a:prstGeom>
+          <a:noFill/>
+        </p:spPr>
+        <p:txBody>
+          <a:bodyPr wrap="none" rtlCol="0">
+            <a:spAutoFit/>
+          </a:bodyPr>
+          <a:lstStyle/>
+          <a:p>
+            <a:r>
+              <a:rPr lang="de-DE"/>
+              <a:t>metadata.jsonld (optional)</a:t>
+            </a:r>
+            <a:endParaRPr lang="de-DE" dirty="0"/>
+          </a:p>
+        </p:txBody>
+      </p:sp>
+      <p:cxnSp>
+        <p:nvCxnSpPr>
+          <p:cNvPr id="24" name="Gerader Verbinder 23">
+            <a:extLst>
+              <a:ext uri="{FF2B5EF4-FFF2-40B4-BE49-F238E27FC236}">
+                <a16:creationId xmlns:a16="http://schemas.microsoft.com/office/drawing/2014/main" id="{CFA68703-C4BF-F3AD-0364-FB5B9787F957}"/>
+              </a:ext>
+            </a:extLst>
+          </p:cNvPr>
+          <p:cNvCxnSpPr/>
+          <p:nvPr/>
+        </p:nvCxnSpPr>
+        <p:spPr>
+          <a:xfrm flipH="1">
+            <a:off x="3602224" y="2746575"/>
+            <a:ext cx="662423" cy="1601"/>
+          </a:xfrm>
+          <a:prstGeom prst="line">
+            <a:avLst/>
+          </a:prstGeom>
+          <a:ln>
+            <a:solidFill>
+              <a:schemeClr val="tx1"/>
+            </a:solidFill>
+          </a:ln>
+        </p:spPr>
+        <p:style>
+          <a:lnRef idx="1">
+            <a:schemeClr val="accent1"/>
+          </a:lnRef>
+          <a:fillRef idx="0">
+            <a:schemeClr val="accent1"/>
+          </a:fillRef>
+          <a:effectRef idx="0">
+            <a:schemeClr val="accent1"/>
+          </a:effectRef>
+          <a:fontRef idx="minor">
+            <a:schemeClr val="tx1"/>
+          </a:fontRef>
+        </p:style>
+      </p:cxnSp>
     </p:spTree>
     <p:extLst>
       <p:ext uri="{BB962C8B-B14F-4D97-AF65-F5344CB8AC3E}">
@@ -4222,4 +5460,295 @@
     </a:ext>
   </a:extLst>
 </a:theme>
+</file>
+
+<file path=customXml/item1.xml><?xml version="1.0" encoding="utf-8"?>
+<ct:contentTypeSchema xmlns:ct="http://schemas.microsoft.com/office/2006/metadata/contentType" xmlns:ma="http://schemas.microsoft.com/office/2006/metadata/properties/metaAttributes" ct:_="" ma:_="" ma:contentTypeName="Dokument" ma:contentTypeID="0x010100F6556D697A14B744B0753244BFCF7FA3" ma:contentTypeVersion="18" ma:contentTypeDescription="Ein neues Dokument erstellen." ma:contentTypeScope="" ma:versionID="65f82342f296cca429ae0917d668012c">
+  <xsd:schema xmlns:xsd="http://www.w3.org/2001/XMLSchema" xmlns:xs="http://www.w3.org/2001/XMLSchema" xmlns:p="http://schemas.microsoft.com/office/2006/metadata/properties" xmlns:ns2="e8c83d76-6da4-4bb9-b615-d4196a663eef" xmlns:ns3="ad1f1bdd-4103-499d-af10-68c28ba6cce0" targetNamespace="http://schemas.microsoft.com/office/2006/metadata/properties" ma:root="true" ma:fieldsID="160791d3703725727eea880c11856b8a" ns2:_="" ns3:_="">
+    <xsd:import namespace="e8c83d76-6da4-4bb9-b615-d4196a663eef"/>
+    <xsd:import namespace="ad1f1bdd-4103-499d-af10-68c28ba6cce0"/>
+    <xsd:element name="properties">
+      <xsd:complexType>
+        <xsd:sequence>
+          <xsd:element name="documentManagement">
+            <xsd:complexType>
+              <xsd:all>
+                <xsd:element ref="ns2:MediaServiceMetadata" minOccurs="0"/>
+                <xsd:element ref="ns2:MediaServiceFastMetadata" minOccurs="0"/>
+                <xsd:element ref="ns2:MediaServiceAutoTags" minOccurs="0"/>
+                <xsd:element ref="ns2:MediaServiceOCR" minOccurs="0"/>
+                <xsd:element ref="ns2:MediaServiceGenerationTime" minOccurs="0"/>
+                <xsd:element ref="ns2:MediaServiceEventHashCode" minOccurs="0"/>
+                <xsd:element ref="ns2:MediaServiceAutoKeyPoints" minOccurs="0"/>
+                <xsd:element ref="ns2:MediaServiceKeyPoints" minOccurs="0"/>
+                <xsd:element ref="ns2:MediaServiceDateTaken" minOccurs="0"/>
+                <xsd:element ref="ns2:MediaLengthInSeconds" minOccurs="0"/>
+                <xsd:element ref="ns2:MediaServiceLocation" minOccurs="0"/>
+                <xsd:element ref="ns2:lcf76f155ced4ddcb4097134ff3c332f" minOccurs="0"/>
+                <xsd:element ref="ns3:TaxCatchAll" minOccurs="0"/>
+                <xsd:element ref="ns3:SharedWithUsers" minOccurs="0"/>
+                <xsd:element ref="ns3:SharedWithDetails" minOccurs="0"/>
+                <xsd:element ref="ns2:MediaServiceObjectDetectorVersions" minOccurs="0"/>
+                <xsd:element ref="ns2:MediaServiceSearchProperties" minOccurs="0"/>
+              </xsd:all>
+            </xsd:complexType>
+          </xsd:element>
+        </xsd:sequence>
+      </xsd:complexType>
+    </xsd:element>
+  </xsd:schema>
+  <xsd:schema xmlns:xsd="http://www.w3.org/2001/XMLSchema" xmlns:xs="http://www.w3.org/2001/XMLSchema" xmlns:dms="http://schemas.microsoft.com/office/2006/documentManagement/types" xmlns:pc="http://schemas.microsoft.com/office/infopath/2007/PartnerControls" targetNamespace="e8c83d76-6da4-4bb9-b615-d4196a663eef" elementFormDefault="qualified">
+    <xsd:import namespace="http://schemas.microsoft.com/office/2006/documentManagement/types"/>
+    <xsd:import namespace="http://schemas.microsoft.com/office/infopath/2007/PartnerControls"/>
+    <xsd:element name="MediaServiceMetadata" ma:index="8" nillable="true" ma:displayName="MediaServiceMetadata" ma:hidden="true" ma:internalName="MediaServiceMetadata" ma:readOnly="true">
+      <xsd:simpleType>
+        <xsd:restriction base="dms:Note"/>
+      </xsd:simpleType>
+    </xsd:element>
+    <xsd:element name="MediaServiceFastMetadata" ma:index="9" nillable="true" ma:displayName="MediaServiceFastMetadata" ma:hidden="true" ma:internalName="MediaServiceFastMetadata" ma:readOnly="true">
+      <xsd:simpleType>
+        <xsd:restriction base="dms:Note"/>
+      </xsd:simpleType>
+    </xsd:element>
+    <xsd:element name="MediaServiceAutoTags" ma:index="10" nillable="true" ma:displayName="Tags" ma:internalName="MediaServiceAutoTags" ma:readOnly="true">
+      <xsd:simpleType>
+        <xsd:restriction base="dms:Text"/>
+      </xsd:simpleType>
+    </xsd:element>
+    <xsd:element name="MediaServiceOCR" ma:index="11" nillable="true" ma:displayName="Extracted Text" ma:internalName="MediaServiceOCR" ma:readOnly="true">
+      <xsd:simpleType>
+        <xsd:restriction base="dms:Note">
+          <xsd:maxLength value="255"/>
+        </xsd:restriction>
+      </xsd:simpleType>
+    </xsd:element>
+    <xsd:element name="MediaServiceGenerationTime" ma:index="12" nillable="true" ma:displayName="MediaServiceGenerationTime" ma:hidden="true" ma:internalName="MediaServiceGenerationTime" ma:readOnly="true">
+      <xsd:simpleType>
+        <xsd:restriction base="dms:Text"/>
+      </xsd:simpleType>
+    </xsd:element>
+    <xsd:element name="MediaServiceEventHashCode" ma:index="13" nillable="true" ma:displayName="MediaServiceEventHashCode" ma:hidden="true" ma:internalName="MediaServiceEventHashCode" ma:readOnly="true">
+      <xsd:simpleType>
+        <xsd:restriction base="dms:Text"/>
+      </xsd:simpleType>
+    </xsd:element>
+    <xsd:element name="MediaServiceAutoKeyPoints" ma:index="14" nillable="true" ma:displayName="MediaServiceAutoKeyPoints" ma:hidden="true" ma:internalName="MediaServiceAutoKeyPoints" ma:readOnly="true">
+      <xsd:simpleType>
+        <xsd:restriction base="dms:Note"/>
+      </xsd:simpleType>
+    </xsd:element>
+    <xsd:element name="MediaServiceKeyPoints" ma:index="15" nillable="true" ma:displayName="KeyPoints" ma:internalName="MediaServiceKeyPoints" ma:readOnly="true">
+      <xsd:simpleType>
+        <xsd:restriction base="dms:Note">
+          <xsd:maxLength value="255"/>
+        </xsd:restriction>
+      </xsd:simpleType>
+    </xsd:element>
+    <xsd:element name="MediaServiceDateTaken" ma:index="16" nillable="true" ma:displayName="MediaServiceDateTaken" ma:hidden="true" ma:internalName="MediaServiceDateTaken" ma:readOnly="true">
+      <xsd:simpleType>
+        <xsd:restriction base="dms:Text"/>
+      </xsd:simpleType>
+    </xsd:element>
+    <xsd:element name="MediaLengthInSeconds" ma:index="17" nillable="true" ma:displayName="Length (seconds)" ma:internalName="MediaLengthInSeconds" ma:readOnly="true">
+      <xsd:simpleType>
+        <xsd:restriction base="dms:Unknown"/>
+      </xsd:simpleType>
+    </xsd:element>
+    <xsd:element name="MediaServiceLocation" ma:index="18" nillable="true" ma:displayName="Location" ma:internalName="MediaServiceLocation" ma:readOnly="true">
+      <xsd:simpleType>
+        <xsd:restriction base="dms:Text"/>
+      </xsd:simpleType>
+    </xsd:element>
+    <xsd:element name="lcf76f155ced4ddcb4097134ff3c332f" ma:index="20" nillable="true" ma:taxonomy="true" ma:internalName="lcf76f155ced4ddcb4097134ff3c332f" ma:taxonomyFieldName="MediaServiceImageTags" ma:displayName="Bildmarkierungen" ma:readOnly="false" ma:fieldId="{5cf76f15-5ced-4ddc-b409-7134ff3c332f}" ma:taxonomyMulti="true" ma:sspId="23238e37-9e1f-4ff8-b9a7-a31ec565c61b" ma:termSetId="09814cd3-568e-fe90-9814-8d621ff8fb84" ma:anchorId="fba54fb3-c3e1-fe81-a776-ca4b69148c4d" ma:open="true" ma:isKeyword="false">
+      <xsd:complexType>
+        <xsd:sequence>
+          <xsd:element ref="pc:Terms" minOccurs="0" maxOccurs="1"/>
+        </xsd:sequence>
+      </xsd:complexType>
+    </xsd:element>
+    <xsd:element name="MediaServiceObjectDetectorVersions" ma:index="24" nillable="true" ma:displayName="MediaServiceObjectDetectorVersions" ma:description="" ma:hidden="true" ma:indexed="true" ma:internalName="MediaServiceObjectDetectorVersions" ma:readOnly="true">
+      <xsd:simpleType>
+        <xsd:restriction base="dms:Text"/>
+      </xsd:simpleType>
+    </xsd:element>
+    <xsd:element name="MediaServiceSearchProperties" ma:index="25" nillable="true" ma:displayName="MediaServiceSearchProperties" ma:hidden="true" ma:internalName="MediaServiceSearchProperties" ma:readOnly="true">
+      <xsd:simpleType>
+        <xsd:restriction base="dms:Note"/>
+      </xsd:simpleType>
+    </xsd:element>
+  </xsd:schema>
+  <xsd:schema xmlns:xsd="http://www.w3.org/2001/XMLSchema" xmlns:xs="http://www.w3.org/2001/XMLSchema" xmlns:dms="http://schemas.microsoft.com/office/2006/documentManagement/types" xmlns:pc="http://schemas.microsoft.com/office/infopath/2007/PartnerControls" targetNamespace="ad1f1bdd-4103-499d-af10-68c28ba6cce0" elementFormDefault="qualified">
+    <xsd:import namespace="http://schemas.microsoft.com/office/2006/documentManagement/types"/>
+    <xsd:import namespace="http://schemas.microsoft.com/office/infopath/2007/PartnerControls"/>
+    <xsd:element name="TaxCatchAll" ma:index="21" nillable="true" ma:displayName="Taxonomy Catch All Column" ma:hidden="true" ma:list="{797f4298-9c40-4f83-86c2-a164a0cc813c}" ma:internalName="TaxCatchAll" ma:showField="CatchAllData" ma:web="ad1f1bdd-4103-499d-af10-68c28ba6cce0">
+      <xsd:complexType>
+        <xsd:complexContent>
+          <xsd:extension base="dms:MultiChoiceLookup">
+            <xsd:sequence>
+              <xsd:element name="Value" type="dms:Lookup" maxOccurs="unbounded" minOccurs="0" nillable="true"/>
+            </xsd:sequence>
+          </xsd:extension>
+        </xsd:complexContent>
+      </xsd:complexType>
+    </xsd:element>
+    <xsd:element name="SharedWithUsers" ma:index="22" nillable="true" ma:displayName="Freigegeben für" ma:internalName="SharedWithUsers" ma:readOnly="true">
+      <xsd:complexType>
+        <xsd:complexContent>
+          <xsd:extension base="dms:UserMulti">
+            <xsd:sequence>
+              <xsd:element name="UserInfo" minOccurs="0" maxOccurs="unbounded">
+                <xsd:complexType>
+                  <xsd:sequence>
+                    <xsd:element name="DisplayName" type="xsd:string" minOccurs="0"/>
+                    <xsd:element name="AccountId" type="dms:UserId" minOccurs="0" nillable="true"/>
+                    <xsd:element name="AccountType" type="xsd:string" minOccurs="0"/>
+                  </xsd:sequence>
+                </xsd:complexType>
+              </xsd:element>
+            </xsd:sequence>
+          </xsd:extension>
+        </xsd:complexContent>
+      </xsd:complexType>
+    </xsd:element>
+    <xsd:element name="SharedWithDetails" ma:index="23" nillable="true" ma:displayName="Freigegeben für - Details" ma:internalName="SharedWithDetails" ma:readOnly="true">
+      <xsd:simpleType>
+        <xsd:restriction base="dms:Note">
+          <xsd:maxLength value="255"/>
+        </xsd:restriction>
+      </xsd:simpleType>
+    </xsd:element>
+  </xsd:schema>
+  <xsd:schema xmlns="http://schemas.openxmlformats.org/package/2006/metadata/core-properties" xmlns:xsd="http://www.w3.org/2001/XMLSchema" xmlns:xsi="http://www.w3.org/2001/XMLSchema-instance" xmlns:dc="http://purl.org/dc/elements/1.1/" xmlns:dcterms="http://purl.org/dc/terms/" xmlns:odoc="http://schemas.microsoft.com/internal/obd" targetNamespace="http://schemas.openxmlformats.org/package/2006/metadata/core-properties" elementFormDefault="qualified" attributeFormDefault="unqualified" blockDefault="#all">
+    <xsd:import namespace="http://purl.org/dc/elements/1.1/" schemaLocation="http://dublincore.org/schemas/xmls/qdc/2003/04/02/dc.xsd"/>
+    <xsd:import namespace="http://purl.org/dc/terms/" schemaLocation="http://dublincore.org/schemas/xmls/qdc/2003/04/02/dcterms.xsd"/>
+    <xsd:element name="coreProperties" type="CT_coreProperties"/>
+    <xsd:complexType name="CT_coreProperties">
+      <xsd:all>
+        <xsd:element ref="dc:creator" minOccurs="0" maxOccurs="1"/>
+        <xsd:element ref="dcterms:created" minOccurs="0" maxOccurs="1"/>
+        <xsd:element ref="dc:identifier" minOccurs="0" maxOccurs="1"/>
+        <xsd:element name="contentType" minOccurs="0" maxOccurs="1" type="xsd:string" ma:index="0" ma:displayName="Inhaltstyp"/>
+        <xsd:element ref="dc:title" minOccurs="0" maxOccurs="1" ma:index="4" ma:displayName="Titel"/>
+        <xsd:element ref="dc:subject" minOccurs="0" maxOccurs="1"/>
+        <xsd:element ref="dc:description" minOccurs="0" maxOccurs="1"/>
+        <xsd:element name="keywords" minOccurs="0" maxOccurs="1" type="xsd:string"/>
+        <xsd:element ref="dc:language" minOccurs="0" maxOccurs="1"/>
+        <xsd:element name="category" minOccurs="0" maxOccurs="1" type="xsd:string"/>
+        <xsd:element name="version" minOccurs="0" maxOccurs="1" type="xsd:string"/>
+        <xsd:element name="revision" minOccurs="0" maxOccurs="1" type="xsd:string">
+          <xsd:annotation>
+            <xsd:documentation>
+                        This value indicates the number of saves or revisions. The application is responsible for updating this value after each revision.
+                    </xsd:documentation>
+          </xsd:annotation>
+        </xsd:element>
+        <xsd:element name="lastModifiedBy" minOccurs="0" maxOccurs="1" type="xsd:string"/>
+        <xsd:element ref="dcterms:modified" minOccurs="0" maxOccurs="1"/>
+        <xsd:element name="contentStatus" minOccurs="0" maxOccurs="1" type="xsd:string"/>
+      </xsd:all>
+    </xsd:complexType>
+  </xsd:schema>
+  <xs:schema xmlns:pc="http://schemas.microsoft.com/office/infopath/2007/PartnerControls" xmlns:xs="http://www.w3.org/2001/XMLSchema" targetNamespace="http://schemas.microsoft.com/office/infopath/2007/PartnerControls" elementFormDefault="qualified" attributeFormDefault="unqualified">
+    <xs:element name="Person">
+      <xs:complexType>
+        <xs:sequence>
+          <xs:element ref="pc:DisplayName" minOccurs="0"/>
+          <xs:element ref="pc:AccountId" minOccurs="0"/>
+          <xs:element ref="pc:AccountType" minOccurs="0"/>
+        </xs:sequence>
+      </xs:complexType>
+    </xs:element>
+    <xs:element name="DisplayName" type="xs:string"/>
+    <xs:element name="AccountId" type="xs:string"/>
+    <xs:element name="AccountType" type="xs:string"/>
+    <xs:element name="BDCAssociatedEntity">
+      <xs:complexType>
+        <xs:sequence>
+          <xs:element ref="pc:BDCEntity" minOccurs="0" maxOccurs="unbounded"/>
+        </xs:sequence>
+        <xs:attribute ref="pc:EntityNamespace"/>
+        <xs:attribute ref="pc:EntityName"/>
+        <xs:attribute ref="pc:SystemInstanceName"/>
+        <xs:attribute ref="pc:AssociationName"/>
+      </xs:complexType>
+    </xs:element>
+    <xs:attribute name="EntityNamespace" type="xs:string"/>
+    <xs:attribute name="EntityName" type="xs:string"/>
+    <xs:attribute name="SystemInstanceName" type="xs:string"/>
+    <xs:attribute name="AssociationName" type="xs:string"/>
+    <xs:element name="BDCEntity">
+      <xs:complexType>
+        <xs:sequence>
+          <xs:element ref="pc:EntityDisplayName" minOccurs="0"/>
+          <xs:element ref="pc:EntityInstanceReference" minOccurs="0"/>
+          <xs:element ref="pc:EntityId1" minOccurs="0"/>
+          <xs:element ref="pc:EntityId2" minOccurs="0"/>
+          <xs:element ref="pc:EntityId3" minOccurs="0"/>
+          <xs:element ref="pc:EntityId4" minOccurs="0"/>
+          <xs:element ref="pc:EntityId5" minOccurs="0"/>
+        </xs:sequence>
+      </xs:complexType>
+    </xs:element>
+    <xs:element name="EntityDisplayName" type="xs:string"/>
+    <xs:element name="EntityInstanceReference" type="xs:string"/>
+    <xs:element name="EntityId1" type="xs:string"/>
+    <xs:element name="EntityId2" type="xs:string"/>
+    <xs:element name="EntityId3" type="xs:string"/>
+    <xs:element name="EntityId4" type="xs:string"/>
+    <xs:element name="EntityId5" type="xs:string"/>
+    <xs:element name="Terms">
+      <xs:complexType>
+        <xs:sequence>
+          <xs:element ref="pc:TermInfo" minOccurs="0" maxOccurs="unbounded"/>
+        </xs:sequence>
+      </xs:complexType>
+    </xs:element>
+    <xs:element name="TermInfo">
+      <xs:complexType>
+        <xs:sequence>
+          <xs:element ref="pc:TermName" minOccurs="0"/>
+          <xs:element ref="pc:TermId" minOccurs="0"/>
+        </xs:sequence>
+      </xs:complexType>
+    </xs:element>
+    <xs:element name="TermName" type="xs:string"/>
+    <xs:element name="TermId" type="xs:string"/>
+  </xs:schema>
+</ct:contentTypeSchema>
+</file>
+
+<file path=customXml/item2.xml><?xml version="1.0" encoding="utf-8"?>
+<?mso-contentType ?>
+<FormTemplates xmlns="http://schemas.microsoft.com/sharepoint/v3/contenttype/forms">
+  <Display>DocumentLibraryForm</Display>
+  <Edit>DocumentLibraryForm</Edit>
+  <New>DocumentLibraryForm</New>
+</FormTemplates>
+</file>
+
+<file path=customXml/itemProps1.xml><?xml version="1.0" encoding="utf-8"?>
+<ds:datastoreItem xmlns:ds="http://schemas.openxmlformats.org/officeDocument/2006/customXml" ds:itemID="{DBCDCEC4-DC60-411E-8E17-E6AE6066F31D}">
+  <ds:schemaRefs>
+    <ds:schemaRef ds:uri="http://schemas.microsoft.com/office/2006/metadata/contentType"/>
+    <ds:schemaRef ds:uri="http://schemas.microsoft.com/office/2006/metadata/properties/metaAttributes"/>
+    <ds:schemaRef ds:uri="http://www.w3.org/2001/XMLSchema"/>
+    <ds:schemaRef ds:uri="http://schemas.microsoft.com/office/2006/metadata/properties"/>
+    <ds:schemaRef ds:uri="e8c83d76-6da4-4bb9-b615-d4196a663eef"/>
+    <ds:schemaRef ds:uri="ad1f1bdd-4103-499d-af10-68c28ba6cce0"/>
+    <ds:schemaRef ds:uri="http://schemas.microsoft.com/office/2006/documentManagement/types"/>
+    <ds:schemaRef ds:uri="http://schemas.microsoft.com/office/infopath/2007/PartnerControls"/>
+    <ds:schemaRef ds:uri="http://schemas.openxmlformats.org/package/2006/metadata/core-properties"/>
+    <ds:schemaRef ds:uri="http://purl.org/dc/elements/1.1/"/>
+    <ds:schemaRef ds:uri="http://purl.org/dc/terms/"/>
+    <ds:schemaRef ds:uri="http://schemas.microsoft.com/internal/obd"/>
+  </ds:schemaRefs>
+</ds:datastoreItem>
+</file>
+
+<file path=customXml/itemProps2.xml><?xml version="1.0" encoding="utf-8"?>
+<ds:datastoreItem xmlns:ds="http://schemas.openxmlformats.org/officeDocument/2006/customXml" ds:itemID="{5D5583E4-5C88-4C20-80B1-CA0D55519A6C}">
+  <ds:schemaRefs>
+    <ds:schemaRef ds:uri="http://schemas.microsoft.com/sharepoint/v3/contenttype/forms"/>
+  </ds:schemaRefs>
+</ds:datastoreItem>
 </file>
</xml_diff>